<commit_message>
Updated picture in powerpoint
</commit_message>
<xml_diff>
--- a/doc/Exam/Exam.pptx
+++ b/doc/Exam/Exam.pptx
@@ -317,7 +317,7 @@
           <a:p>
             <a:fld id="{34F27593-5FC0-4184-A36C-A287F7C1CF7C}" type="datetime1">
               <a:rPr lang="da-DK" smtClean="0"/>
-              <a:t>06-06-2016</a:t>
+              <a:t>07-06-2016</a:t>
             </a:fld>
             <a:endParaRPr lang="da-DK"/>
           </a:p>
@@ -12312,7 +12312,11 @@
         </p:nvPicPr>
         <p:blipFill>
           <a:blip r:embed="rId3">
-            <a:alphaModFix/>
+            <a:extLst>
+              <a:ext uri="{28A0092B-C50C-407E-A947-70E740481C1C}">
+                <a14:useLocalDpi xmlns:a14="http://schemas.microsoft.com/office/drawing/2010/main" val="0"/>
+              </a:ext>
+            </a:extLst>
           </a:blip>
           <a:stretch>
             <a:fillRect/>
@@ -12320,8 +12324,8 @@
         </p:blipFill>
         <p:spPr>
           <a:xfrm>
-            <a:off x="5450274" y="609375"/>
-            <a:ext cx="3458225" cy="3632125"/>
+            <a:off x="5450274" y="609379"/>
+            <a:ext cx="3458225" cy="3632117"/>
           </a:xfrm>
           <a:prstGeom prst="rect">
             <a:avLst/>
@@ -12504,38 +12508,12 @@
               <a:buChar char="•"/>
             </a:pPr>
             <a:r>
-              <a:rPr lang="da" i="1" dirty="0"/>
-              <a:t>Independent events og concurrent</a:t>
+              <a:rPr lang="da" dirty="0" smtClean="0"/>
+              <a:t>Historik </a:t>
             </a:r>
             <a:r>
               <a:rPr lang="da" dirty="0"/>
-              <a:t> </a:t>
-            </a:r>
-            <a:br>
-              <a:rPr lang="da" dirty="0"/>
-            </a:br>
-            <a:r>
-              <a:rPr lang="da" dirty="0"/>
-              <a:t>executions </a:t>
-            </a:r>
-          </a:p>
-          <a:p>
-            <a:pPr marL="514350" lvl="0" indent="-285750" rtl="0">
-              <a:lnSpc>
-                <a:spcPct val="150000"/>
-              </a:lnSpc>
-              <a:spcBef>
-                <a:spcPts val="0"/>
-              </a:spcBef>
-              <a:spcAft>
-                <a:spcPts val="0"/>
-              </a:spcAft>
-              <a:buFont typeface="Arial" panose="020B0604020202020204" pitchFamily="34" charset="0"/>
-              <a:buChar char="•"/>
-            </a:pPr>
-            <a:r>
-              <a:rPr lang="da" dirty="0"/>
-              <a:t>Historik som en </a:t>
+              <a:t>som en </a:t>
             </a:r>
             <a:r>
               <a:rPr lang="da" i="1" dirty="0"/>
@@ -12810,38 +12788,12 @@
               <a:buChar char="•"/>
             </a:pPr>
             <a:r>
-              <a:rPr lang="da" i="1" dirty="0"/>
-              <a:t>Independent events og concurrent</a:t>
+              <a:rPr lang="da" dirty="0" smtClean="0"/>
+              <a:t>Historik </a:t>
             </a:r>
             <a:r>
               <a:rPr lang="da" dirty="0"/>
-              <a:t> </a:t>
-            </a:r>
-            <a:br>
-              <a:rPr lang="da" dirty="0"/>
-            </a:br>
-            <a:r>
-              <a:rPr lang="da" dirty="0"/>
-              <a:t>executions </a:t>
-            </a:r>
-          </a:p>
-          <a:p>
-            <a:pPr marL="514350" lvl="0" indent="-285750" rtl="0">
-              <a:lnSpc>
-                <a:spcPct val="150000"/>
-              </a:lnSpc>
-              <a:spcBef>
-                <a:spcPts val="0"/>
-              </a:spcBef>
-              <a:spcAft>
-                <a:spcPts val="0"/>
-              </a:spcAft>
-              <a:buFont typeface="Arial" panose="020B0604020202020204" pitchFamily="34" charset="0"/>
-              <a:buChar char="•"/>
-            </a:pPr>
-            <a:r>
-              <a:rPr lang="da" dirty="0"/>
-              <a:t>Historik som en </a:t>
+              <a:t>som en </a:t>
             </a:r>
             <a:r>
               <a:rPr lang="da" i="1" dirty="0"/>

</xml_diff>